<commit_message>
upload de resultados com 741/1530 (~48%) da base dados pronta
</commit_message>
<xml_diff>
--- a/results/cienciometria.pptx
+++ b/results/cienciometria.pptx
@@ -12,8 +12,6 @@
     <p:sldId id="260" r:id="rId7"/>
     <p:sldId id="261" r:id="rId8"/>
     <p:sldId id="262" r:id="rId9"/>
-    <p:sldId id="263" r:id="rId10"/>
-    <p:sldId id="264" r:id="rId11"/>
   </p:sldIdLst>
   <p:sldSz cx="10080625" cy="5670550"/>
   <p:notesSz cx="7559675" cy="10691813"/>
@@ -1837,7 +1835,7 @@
         <p:spPr>
           <a:xfrm>
             <a:off x="534600" y="2880000"/>
-            <a:ext cx="3964680" cy="1979280"/>
+            <a:ext cx="3964320" cy="1978920"/>
           </a:xfrm>
           <a:prstGeom prst="rect">
             <a:avLst/>
@@ -1860,7 +1858,7 @@
         <p:spPr>
           <a:xfrm>
             <a:off x="4875120" y="900000"/>
-            <a:ext cx="4686480" cy="1799280"/>
+            <a:ext cx="4686120" cy="1798920"/>
           </a:xfrm>
           <a:prstGeom prst="rect">
             <a:avLst/>
@@ -1883,7 +1881,7 @@
         <p:spPr>
           <a:xfrm>
             <a:off x="221400" y="396360"/>
-            <a:ext cx="4381920" cy="1838160"/>
+            <a:ext cx="4381560" cy="1837800"/>
           </a:xfrm>
           <a:prstGeom prst="rect">
             <a:avLst/>
@@ -1936,7 +1934,7 @@
         <p:spPr>
           <a:xfrm>
             <a:off x="4898160" y="60120"/>
-            <a:ext cx="4641120" cy="3846600"/>
+            <a:ext cx="4640760" cy="3846240"/>
           </a:xfrm>
           <a:prstGeom prst="rect">
             <a:avLst/>
@@ -1959,7 +1957,7 @@
         <p:spPr>
           <a:xfrm>
             <a:off x="221400" y="396360"/>
-            <a:ext cx="4381920" cy="1838160"/>
+            <a:ext cx="4381560" cy="1837800"/>
           </a:xfrm>
           <a:prstGeom prst="rect">
             <a:avLst/>
@@ -2495,7 +2493,7 @@
                           </a:solidFill>
                           <a:latin typeface="Arial"/>
                         </a:rPr>
-                        <a:t>-143</a:t>
+                        <a:t>-356</a:t>
                       </a:r>
                       <a:endParaRPr b="0" lang="en-GB" sz="1200" spc="-1" strike="noStrike">
                         <a:latin typeface="Arial"/>
@@ -2918,7 +2916,7 @@
                           </a:solidFill>
                           <a:latin typeface="Arial"/>
                         </a:rPr>
-                        <a:t>104 (+54?)</a:t>
+                        <a:t>335 (+50?)</a:t>
                       </a:r>
                       <a:endParaRPr b="0" lang="en-GB" sz="1200" spc="-1" strike="noStrike">
                         <a:latin typeface="Arial"/>
@@ -2959,43 +2957,61 @@
       <p:sp>
         <p:nvSpPr>
           <p:cNvPr id="44" name=""/>
-          <p:cNvSpPr txBox="1"/>
+          <p:cNvSpPr/>
           <p:nvPr/>
         </p:nvSpPr>
         <p:spPr>
           <a:xfrm>
             <a:off x="7740000" y="819360"/>
-            <a:ext cx="1260000" cy="431640"/>
-          </a:xfrm>
-          <a:prstGeom prst="rect">
-            <a:avLst/>
-          </a:prstGeom>
-          <a:noFill/>
-          <a:ln w="0">
-            <a:noFill/>
-          </a:ln>
-        </p:spPr>
+            <a:ext cx="1259640" cy="431280"/>
+          </a:xfrm>
+          <a:prstGeom prst="rect">
+            <a:avLst/>
+          </a:prstGeom>
+          <a:noFill/>
+          <a:ln w="0">
+            <a:noFill/>
+          </a:ln>
+        </p:spPr>
+        <p:style>
+          <a:lnRef idx="0"/>
+          <a:fillRef idx="0"/>
+          <a:effectRef idx="0"/>
+          <a:fontRef idx="minor"/>
+        </p:style>
         <p:txBody>
           <a:bodyPr lIns="90000" rIns="90000" tIns="45000" bIns="45000" anchor="t">
             <a:noAutofit/>
           </a:bodyPr>
           <a:p>
+            <a:pPr>
+              <a:lnSpc>
+                <a:spcPct val="100000"/>
+              </a:lnSpc>
+              <a:buNone/>
+            </a:pPr>
             <a:r>
               <a:rPr b="0" lang="en-GB" sz="1200" spc="-1" strike="noStrike">
                 <a:latin typeface="Arial"/>
               </a:rPr>
-              <a:t>22/09/2022</a:t>
+              <a:t>20/12/2022</a:t>
             </a:r>
             <a:endParaRPr b="0" lang="en-GB" sz="1200" spc="-1" strike="noStrike">
               <a:latin typeface="Arial"/>
             </a:endParaRPr>
           </a:p>
           <a:p>
+            <a:pPr>
+              <a:lnSpc>
+                <a:spcPct val="100000"/>
+              </a:lnSpc>
+              <a:buNone/>
+            </a:pPr>
             <a:r>
               <a:rPr b="0" lang="en-GB" sz="1200" spc="-1" strike="noStrike">
                 <a:latin typeface="Arial"/>
               </a:rPr>
-              <a:t>N=301</a:t>
+              <a:t>N=741 (~48%)</a:t>
             </a:r>
             <a:endParaRPr b="0" lang="en-GB" sz="1200" spc="-1" strike="noStrike">
               <a:latin typeface="Arial"/>
@@ -3045,8 +3061,8 @@
         </p:blipFill>
         <p:spPr>
           <a:xfrm>
-            <a:off x="1460160" y="720000"/>
-            <a:ext cx="3759840" cy="4500000"/>
+            <a:off x="1100520" y="900000"/>
+            <a:ext cx="3759480" cy="3780000"/>
           </a:xfrm>
           <a:prstGeom prst="rect">
             <a:avLst/>
@@ -3059,97 +3075,44 @@
       <p:sp>
         <p:nvSpPr>
           <p:cNvPr id="46" name=""/>
-          <p:cNvSpPr txBox="1"/>
+          <p:cNvSpPr/>
           <p:nvPr/>
         </p:nvSpPr>
         <p:spPr>
           <a:xfrm>
-            <a:off x="5796000" y="646200"/>
-            <a:ext cx="3060000" cy="4185720"/>
-          </a:xfrm>
-          <a:prstGeom prst="rect">
-            <a:avLst/>
-          </a:prstGeom>
-          <a:noFill/>
-          <a:ln w="0">
-            <a:noFill/>
-          </a:ln>
-        </p:spPr>
+            <a:off x="5400000" y="1186200"/>
+            <a:ext cx="3924000" cy="1513800"/>
+          </a:xfrm>
+          <a:prstGeom prst="rect">
+            <a:avLst/>
+          </a:prstGeom>
+          <a:noFill/>
+          <a:ln w="0">
+            <a:noFill/>
+          </a:ln>
+        </p:spPr>
+        <p:style>
+          <a:lnRef idx="0"/>
+          <a:fillRef idx="0"/>
+          <a:effectRef idx="0"/>
+          <a:fontRef idx="minor"/>
+        </p:style>
         <p:txBody>
           <a:bodyPr lIns="90000" rIns="90000" tIns="45000" bIns="45000" anchor="t">
             <a:noAutofit/>
           </a:bodyPr>
           <a:p>
+            <a:pPr>
+              <a:lnSpc>
+                <a:spcPct val="100000"/>
+              </a:lnSpc>
+              <a:buNone/>
+            </a:pPr>
             <a:r>
               <a:rPr b="0" lang="en-GB" sz="1800" spc="-1" strike="noStrike">
                 <a:latin typeface="Arial"/>
               </a:rPr>
-              <a:t>Hipotese – extracao seletiva eh fenomeno “recente” e esta em expansao recente, porem ciencia (geracao de conhecimento) em declinio</a:t>
-            </a:r>
-            <a:endParaRPr b="0" lang="en-GB" sz="1800" spc="-1" strike="noStrike">
-              <a:latin typeface="Arial"/>
-            </a:endParaRPr>
-          </a:p>
-          <a:p>
-            <a:endParaRPr b="0" lang="en-GB" sz="1800" spc="-1" strike="noStrike">
-              <a:latin typeface="Arial"/>
-            </a:endParaRPr>
-          </a:p>
-          <a:p>
-            <a:endParaRPr b="0" lang="en-GB" sz="1800" spc="-1" strike="noStrike">
-              <a:latin typeface="Arial"/>
-            </a:endParaRPr>
-          </a:p>
-          <a:p>
-            <a:r>
-              <a:rPr b="0" lang="en-GB" sz="1800" spc="-1" strike="noStrike">
-                <a:latin typeface="Arial"/>
-              </a:rPr>
-              <a:t>&gt; Lacunas de conhecimento local (neotropico e africa), grupos taxonomicos e efeitos (recursos hidricos);</a:t>
-            </a:r>
-            <a:endParaRPr b="0" lang="en-GB" sz="1800" spc="-1" strike="noStrike">
-              <a:latin typeface="Arial"/>
-            </a:endParaRPr>
-          </a:p>
-          <a:p>
-            <a:endParaRPr b="0" lang="en-GB" sz="1800" spc="-1" strike="noStrike">
-              <a:latin typeface="Arial"/>
-            </a:endParaRPr>
-          </a:p>
-          <a:p>
-            <a:r>
-              <a:rPr b="0" lang="en-GB" sz="1800" spc="-1" strike="noStrike">
-                <a:latin typeface="Arial"/>
-              </a:rPr>
-              <a:t>&gt; </a:t>
-            </a:r>
-            <a:r>
-              <a:rPr b="0" i="1" lang="en-GB" sz="1800" spc="-1" strike="noStrike">
-                <a:latin typeface="Arial"/>
-              </a:rPr>
-              <a:t>common sense</a:t>
-            </a:r>
-            <a:r>
-              <a:rPr b="0" lang="en-GB" sz="1800" spc="-1" strike="noStrike">
-                <a:latin typeface="Arial"/>
-              </a:rPr>
-              <a:t> RIL eh sustentavel;</a:t>
-            </a:r>
-            <a:endParaRPr b="0" lang="en-GB" sz="1800" spc="-1" strike="noStrike">
-              <a:latin typeface="Arial"/>
-            </a:endParaRPr>
-          </a:p>
-          <a:p>
-            <a:endParaRPr b="0" lang="en-GB" sz="1800" spc="-1" strike="noStrike">
-              <a:latin typeface="Arial"/>
-            </a:endParaRPr>
-          </a:p>
-          <a:p>
-            <a:r>
-              <a:rPr b="0" lang="en-GB" sz="1800" spc="-1" strike="noStrike">
-                <a:latin typeface="Arial"/>
-              </a:rPr>
-              <a:t>&gt; […]; </a:t>
+              <a:t>OBS. Com o avanco dos dados, muito provavelmente, as barras mudarao depois de 2010-14. A pergunta eh: elas ultrapassarao a marca de 2005-09 ou vao ficar abaixo? Nesse ultimo caso, sua hipotese de que o numero de estudos esta diminuindo se confirma - mesmo com varios gaps de conhecimento ainda e aumento do numero de concessoes.</a:t>
             </a:r>
             <a:endParaRPr b="0" lang="en-GB" sz="1800" spc="-1" strike="noStrike">
               <a:latin typeface="Arial"/>
@@ -3199,8 +3162,8 @@
         </p:blipFill>
         <p:spPr>
           <a:xfrm>
-            <a:off x="21240" y="163080"/>
-            <a:ext cx="10080360" cy="4860360"/>
+            <a:off x="561240" y="711000"/>
+            <a:ext cx="8978760" cy="4329000"/>
           </a:xfrm>
           <a:prstGeom prst="rect">
             <a:avLst/>
@@ -3210,6 +3173,54 @@
           </a:ln>
         </p:spPr>
       </p:pic>
+      <p:sp>
+        <p:nvSpPr>
+          <p:cNvPr id="48" name=""/>
+          <p:cNvSpPr/>
+          <p:nvPr/>
+        </p:nvSpPr>
+        <p:spPr>
+          <a:xfrm>
+            <a:off x="1116000" y="2952720"/>
+            <a:ext cx="2088000" cy="899280"/>
+          </a:xfrm>
+          <a:prstGeom prst="rect">
+            <a:avLst/>
+          </a:prstGeom>
+          <a:noFill/>
+          <a:ln w="0">
+            <a:noFill/>
+          </a:ln>
+        </p:spPr>
+        <p:style>
+          <a:lnRef idx="0"/>
+          <a:fillRef idx="0"/>
+          <a:effectRef idx="0"/>
+          <a:fontRef idx="minor"/>
+        </p:style>
+        <p:txBody>
+          <a:bodyPr lIns="90000" rIns="90000" tIns="45000" bIns="45000" anchor="t">
+            <a:noAutofit/>
+          </a:bodyPr>
+          <a:p>
+            <a:pPr>
+              <a:lnSpc>
+                <a:spcPct val="100000"/>
+              </a:lnSpc>
+              <a:buNone/>
+            </a:pPr>
+            <a:r>
+              <a:rPr b="0" lang="en-GB" sz="1200" spc="-1" strike="noStrike">
+                <a:latin typeface="Arial"/>
+              </a:rPr>
+              <a:t>OBS. Esse numero em preto corresponde a estudos pantropicais</a:t>
+            </a:r>
+            <a:endParaRPr b="0" lang="en-GB" sz="1200" spc="-1" strike="noStrike">
+              <a:latin typeface="Arial"/>
+            </a:endParaRPr>
+          </a:p>
+        </p:txBody>
+      </p:sp>
     </p:spTree>
   </p:cSld>
   <mc:AlternateContent>
@@ -3242,7 +3253,7 @@
       </p:grpSpPr>
       <p:pic>
         <p:nvPicPr>
-          <p:cNvPr id="48" name="" descr=""/>
+          <p:cNvPr id="49" name="" descr=""/>
           <p:cNvPicPr/>
           <p:nvPr/>
         </p:nvPicPr>
@@ -3253,7 +3264,7 @@
         <p:spPr>
           <a:xfrm>
             <a:off x="180000" y="192600"/>
-            <a:ext cx="7025760" cy="5387400"/>
+            <a:ext cx="5400000" cy="5387040"/>
           </a:xfrm>
           <a:prstGeom prst="rect">
             <a:avLst/>
@@ -3263,6 +3274,54 @@
           </a:ln>
         </p:spPr>
       </p:pic>
+      <p:sp>
+        <p:nvSpPr>
+          <p:cNvPr id="50" name=""/>
+          <p:cNvSpPr/>
+          <p:nvPr/>
+        </p:nvSpPr>
+        <p:spPr>
+          <a:xfrm>
+            <a:off x="5796000" y="1006200"/>
+            <a:ext cx="3924000" cy="1513800"/>
+          </a:xfrm>
+          <a:prstGeom prst="rect">
+            <a:avLst/>
+          </a:prstGeom>
+          <a:noFill/>
+          <a:ln w="0">
+            <a:noFill/>
+          </a:ln>
+        </p:spPr>
+        <p:style>
+          <a:lnRef idx="0"/>
+          <a:fillRef idx="0"/>
+          <a:effectRef idx="0"/>
+          <a:fontRef idx="minor"/>
+        </p:style>
+        <p:txBody>
+          <a:bodyPr lIns="90000" rIns="90000" tIns="45000" bIns="45000" anchor="t">
+            <a:noAutofit/>
+          </a:bodyPr>
+          <a:p>
+            <a:pPr>
+              <a:lnSpc>
+                <a:spcPct val="100000"/>
+              </a:lnSpc>
+              <a:buNone/>
+            </a:pPr>
+            <a:r>
+              <a:rPr b="0" lang="en-GB" sz="1800" spc="-1" strike="noStrike">
+                <a:latin typeface="Arial"/>
+              </a:rPr>
+              <a:t>OBS. Aceito sugestoes de melhorias para essas figuras. Cores, orientacao, ordem dos intens… etc.</a:t>
+            </a:r>
+            <a:endParaRPr b="0" lang="en-GB" sz="1800" spc="-1" strike="noStrike">
+              <a:latin typeface="Arial"/>
+            </a:endParaRPr>
+          </a:p>
+        </p:txBody>
+      </p:sp>
     </p:spTree>
   </p:cSld>
   <mc:AlternateContent>
@@ -3295,7 +3354,7 @@
       </p:grpSpPr>
       <p:pic>
         <p:nvPicPr>
-          <p:cNvPr id="49" name="" descr=""/>
+          <p:cNvPr id="51" name="" descr=""/>
           <p:cNvPicPr/>
           <p:nvPr/>
         </p:nvPicPr>
@@ -3305,8 +3364,8 @@
         </p:blipFill>
         <p:spPr>
           <a:xfrm>
-            <a:off x="2241000" y="1800000"/>
-            <a:ext cx="5499000" cy="2611440"/>
+            <a:off x="2160000" y="841680"/>
+            <a:ext cx="4958640" cy="2160000"/>
           </a:xfrm>
           <a:prstGeom prst="rect">
             <a:avLst/>
@@ -3316,1070 +3375,52 @@
           </a:ln>
         </p:spPr>
       </p:pic>
-    </p:spTree>
-  </p:cSld>
-  <mc:AlternateContent>
-    <mc:Choice Requires="p14">
-      <p:transition spd="slow" p14:dur="2000"/>
-    </mc:Choice>
-    <mc:Fallback>
-      <p:transition spd="slow"/>
-    </mc:Fallback>
-  </mc:AlternateContent>
-</p:sld>
-</file>
-
-<file path=ppt/slides/slide8.xml><?xml version="1.0" encoding="utf-8"?>
-<p:sld xmlns:a="http://schemas.openxmlformats.org/drawingml/2006/main" xmlns:p="http://schemas.openxmlformats.org/presentationml/2006/main" xmlns:r="http://schemas.openxmlformats.org/officeDocument/2006/relationships" xmlns:p14="http://schemas.microsoft.com/office/powerpoint/2010/main" xmlns:p15="http://schemas.microsoft.com/office/powerpoint/2012/main" xmlns:mc="http://schemas.openxmlformats.org/markup-compatibility/2006">
-  <p:cSld>
-    <p:spTree>
-      <p:nvGrpSpPr>
-        <p:cNvPr id="1" name=""/>
-        <p:cNvGrpSpPr/>
-        <p:nvPr/>
-      </p:nvGrpSpPr>
-      <p:grpSpPr>
-        <a:xfrm>
-          <a:off x="0" y="0"/>
-          <a:ext cx="0" cy="0"/>
-          <a:chOff x="0" y="0"/>
-          <a:chExt cx="0" cy="0"/>
-        </a:xfrm>
-      </p:grpSpPr>
-    </p:spTree>
-  </p:cSld>
-  <mc:AlternateContent>
-    <mc:Choice Requires="p14">
-      <p:transition spd="slow" p14:dur="2000"/>
-    </mc:Choice>
-    <mc:Fallback>
-      <p:transition spd="slow"/>
-    </mc:Fallback>
-  </mc:AlternateContent>
-</p:sld>
-</file>
-
-<file path=ppt/slides/slide9.xml><?xml version="1.0" encoding="utf-8"?>
-<p:sld xmlns:a="http://schemas.openxmlformats.org/drawingml/2006/main" xmlns:p="http://schemas.openxmlformats.org/presentationml/2006/main" xmlns:r="http://schemas.openxmlformats.org/officeDocument/2006/relationships" xmlns:p14="http://schemas.microsoft.com/office/powerpoint/2010/main" xmlns:p15="http://schemas.microsoft.com/office/powerpoint/2012/main" xmlns:mc="http://schemas.openxmlformats.org/markup-compatibility/2006">
-  <p:cSld>
-    <p:spTree>
-      <p:nvGrpSpPr>
-        <p:cNvPr id="1" name=""/>
-        <p:cNvGrpSpPr/>
-        <p:nvPr/>
-      </p:nvGrpSpPr>
-      <p:grpSpPr>
-        <a:xfrm>
-          <a:off x="0" y="0"/>
-          <a:ext cx="0" cy="0"/>
-          <a:chOff x="0" y="0"/>
-          <a:chExt cx="0" cy="0"/>
-        </a:xfrm>
-      </p:grpSpPr>
-      <p:graphicFrame>
-        <p:nvGraphicFramePr>
-          <p:cNvPr id="50" name=""/>
-          <p:cNvGraphicFramePr/>
+      <p:pic>
+        <p:nvPicPr>
+          <p:cNvPr id="52" name="" descr=""/>
+          <p:cNvPicPr/>
           <p:nvPr/>
-        </p:nvGraphicFramePr>
-        <p:xfrm>
-          <a:off x="1030680" y="1299960"/>
-          <a:ext cx="8019000" cy="3482280"/>
-        </p:xfrm>
-        <a:graphic>
-          <a:graphicData uri="http://schemas.openxmlformats.org/drawingml/2006/table">
-            <a:tbl>
-              <a:tblPr/>
-              <a:tblGrid>
-                <a:gridCol w="1144440"/>
-                <a:gridCol w="846000"/>
-                <a:gridCol w="5148720"/>
-                <a:gridCol w="880200"/>
-              </a:tblGrid>
-              <a:tr h="1018080">
-                <a:tc>
-                  <a:txBody>
-                    <a:bodyPr lIns="90000" rIns="90000" anchor="ctr">
-                      <a:noAutofit/>
-                    </a:bodyPr>
-                    <a:p>
-                      <a:pPr algn="ctr">
-                        <a:lnSpc>
-                          <a:spcPct val="100000"/>
-                        </a:lnSpc>
-                        <a:buNone/>
-                      </a:pPr>
-                      <a:r>
-                        <a:rPr b="1" lang="en-GB" sz="1200" spc="-1" strike="noStrike">
-                          <a:solidFill>
-                            <a:srgbClr val="ffffff"/>
-                          </a:solidFill>
-                          <a:latin typeface="Arial"/>
-                        </a:rPr>
-                        <a:t>Identification</a:t>
-                      </a:r>
-                      <a:endParaRPr b="0" lang="en-GB" sz="1200" spc="-1" strike="noStrike">
-                        <a:latin typeface="Arial"/>
-                      </a:endParaRPr>
-                    </a:p>
-                  </a:txBody>
-                  <a:tcPr anchor="ctr" marL="90000" marR="90000">
-                    <a:lnL w="720">
-                      <a:solidFill>
-                        <a:srgbClr val="ffffff"/>
-                      </a:solidFill>
-                    </a:lnL>
-                    <a:lnR w="720">
-                      <a:solidFill>
-                        <a:srgbClr val="ffffff"/>
-                      </a:solidFill>
-                    </a:lnR>
-                    <a:lnT w="720">
-                      <a:solidFill>
-                        <a:srgbClr val="ffffff"/>
-                      </a:solidFill>
-                    </a:lnT>
-                    <a:lnB w="720">
-                      <a:solidFill>
-                        <a:srgbClr val="ffffff"/>
-                      </a:solidFill>
-                    </a:lnB>
-                    <a:solidFill>
-                      <a:srgbClr val="729fcf"/>
-                    </a:solidFill>
-                  </a:tcPr>
-                </a:tc>
-                <a:tc>
-                  <a:txBody>
-                    <a:bodyPr lIns="90000" rIns="90000" anchor="ctr">
-                      <a:noAutofit/>
-                    </a:bodyPr>
-                    <a:p>
-                      <a:pPr algn="ctr">
-                        <a:lnSpc>
-                          <a:spcPct val="100000"/>
-                        </a:lnSpc>
-                        <a:buNone/>
-                      </a:pPr>
-                      <a:r>
-                        <a:rPr b="0" lang="en-GB" sz="1200" spc="-1" strike="noStrike">
-                          <a:solidFill>
-                            <a:srgbClr val="ffffff"/>
-                          </a:solidFill>
-                          <a:latin typeface="Arial"/>
-                        </a:rPr>
-                        <a:t># Query</a:t>
-                      </a:r>
-                      <a:endParaRPr b="0" lang="en-GB" sz="1200" spc="-1" strike="noStrike">
-                        <a:latin typeface="Arial"/>
-                      </a:endParaRPr>
-                    </a:p>
-                  </a:txBody>
-                  <a:tcPr anchor="ctr" marL="90000" marR="90000">
-                    <a:lnL w="720">
-                      <a:solidFill>
-                        <a:srgbClr val="ffffff"/>
-                      </a:solidFill>
-                    </a:lnL>
-                    <a:lnR w="720">
-                      <a:solidFill>
-                        <a:srgbClr val="ffffff"/>
-                      </a:solidFill>
-                    </a:lnR>
-                    <a:lnT w="720">
-                      <a:solidFill>
-                        <a:srgbClr val="ffffff"/>
-                      </a:solidFill>
-                    </a:lnT>
-                    <a:lnB w="720">
-                      <a:solidFill>
-                        <a:srgbClr val="ffffff"/>
-                      </a:solidFill>
-                    </a:lnB>
-                    <a:solidFill>
-                      <a:srgbClr val="729fcf"/>
-                    </a:solidFill>
-                  </a:tcPr>
-                </a:tc>
-                <a:tc>
-                  <a:txBody>
-                    <a:bodyPr lIns="90000" rIns="90000" anchor="ctr">
-                      <a:noAutofit/>
-                    </a:bodyPr>
-                    <a:p>
-                      <a:pPr>
-                        <a:lnSpc>
-                          <a:spcPct val="100000"/>
-                        </a:lnSpc>
-                        <a:buNone/>
-                      </a:pPr>
-                      <a:r>
-                        <a:rPr b="0" lang="en-GB" sz="1200" spc="-1" strike="noStrike">
-                          <a:solidFill>
-                            <a:srgbClr val="ffffff"/>
-                          </a:solidFill>
-                          <a:latin typeface="Arial"/>
-                        </a:rPr>
-                        <a:t>( TITLE-ABS-KEY ( logging  AND  "tropical forest*" )  OR  </a:t>
-                      </a:r>
-                      <a:endParaRPr b="0" lang="en-GB" sz="1200" spc="-1" strike="noStrike">
-                        <a:latin typeface="Arial"/>
-                      </a:endParaRPr>
-                    </a:p>
-                    <a:p>
-                      <a:pPr>
-                        <a:lnSpc>
-                          <a:spcPct val="100000"/>
-                        </a:lnSpc>
-                        <a:buNone/>
-                      </a:pPr>
-                      <a:r>
-                        <a:rPr b="0" lang="en-GB" sz="1200" spc="-1" strike="noStrike">
-                          <a:solidFill>
-                            <a:srgbClr val="ffffff"/>
-                          </a:solidFill>
-                          <a:latin typeface="Arial"/>
-                        </a:rPr>
-                        <a:t>TITLE-ABS-KEY ( "selective logging"  AND  "tropical forest*" )  OR  </a:t>
-                      </a:r>
-                      <a:endParaRPr b="0" lang="en-GB" sz="1200" spc="-1" strike="noStrike">
-                        <a:latin typeface="Arial"/>
-                      </a:endParaRPr>
-                    </a:p>
-                    <a:p>
-                      <a:pPr>
-                        <a:lnSpc>
-                          <a:spcPct val="100000"/>
-                        </a:lnSpc>
-                        <a:buNone/>
-                      </a:pPr>
-                      <a:r>
-                        <a:rPr b="0" lang="en-GB" sz="1200" spc="-1" strike="noStrike">
-                          <a:solidFill>
-                            <a:srgbClr val="ffffff"/>
-                          </a:solidFill>
-                          <a:latin typeface="Arial"/>
-                        </a:rPr>
-                        <a:t>TITLE-ABS-KEY ( "logging effects"  AND  "tropical forest*" )  OR  </a:t>
-                      </a:r>
-                      <a:endParaRPr b="0" lang="en-GB" sz="1200" spc="-1" strike="noStrike">
-                        <a:latin typeface="Arial"/>
-                      </a:endParaRPr>
-                    </a:p>
-                    <a:p>
-                      <a:pPr>
-                        <a:lnSpc>
-                          <a:spcPct val="100000"/>
-                        </a:lnSpc>
-                        <a:buNone/>
-                      </a:pPr>
-                      <a:r>
-                        <a:rPr b="0" lang="en-GB" sz="1200" spc="-1" strike="noStrike">
-                          <a:solidFill>
-                            <a:srgbClr val="ffffff"/>
-                          </a:solidFill>
-                          <a:latin typeface="Arial"/>
-                        </a:rPr>
-                        <a:t>TITLE-ABS-KEY ( "timber exploitation"  AND  "tropical forest*" ) )  AND  </a:t>
-                      </a:r>
-                      <a:endParaRPr b="0" lang="en-GB" sz="1200" spc="-1" strike="noStrike">
-                        <a:latin typeface="Arial"/>
-                      </a:endParaRPr>
-                    </a:p>
-                    <a:p>
-                      <a:pPr>
-                        <a:lnSpc>
-                          <a:spcPct val="100000"/>
-                        </a:lnSpc>
-                        <a:buNone/>
-                      </a:pPr>
-                      <a:r>
-                        <a:rPr b="0" lang="en-GB" sz="1200" spc="-1" strike="noStrike">
-                          <a:solidFill>
-                            <a:srgbClr val="ffffff"/>
-                          </a:solidFill>
-                          <a:latin typeface="Arial"/>
-                        </a:rPr>
-                        <a:t>PUBYEAR  &gt;  1969</a:t>
-                      </a:r>
-                      <a:endParaRPr b="0" lang="en-GB" sz="1200" spc="-1" strike="noStrike">
-                        <a:latin typeface="Arial"/>
-                      </a:endParaRPr>
-                    </a:p>
-                  </a:txBody>
-                  <a:tcPr anchor="ctr" marL="90000" marR="90000">
-                    <a:lnL w="720">
-                      <a:solidFill>
-                        <a:srgbClr val="ffffff"/>
-                      </a:solidFill>
-                    </a:lnL>
-                    <a:lnR w="720">
-                      <a:solidFill>
-                        <a:srgbClr val="ffffff"/>
-                      </a:solidFill>
-                    </a:lnR>
-                    <a:lnT w="720">
-                      <a:solidFill>
-                        <a:srgbClr val="ffffff"/>
-                      </a:solidFill>
-                    </a:lnT>
-                    <a:lnB w="720">
-                      <a:solidFill>
-                        <a:srgbClr val="ffffff"/>
-                      </a:solidFill>
-                    </a:lnB>
-                    <a:solidFill>
-                      <a:srgbClr val="729fcf"/>
-                    </a:solidFill>
-                  </a:tcPr>
-                </a:tc>
-                <a:tc>
-                  <a:txBody>
-                    <a:bodyPr lIns="90000" rIns="90000" anchor="ctr">
-                      <a:noAutofit/>
-                    </a:bodyPr>
-                    <a:p>
-                      <a:pPr marL="216000" indent="-216000" algn="r">
-                        <a:lnSpc>
-                          <a:spcPct val="100000"/>
-                        </a:lnSpc>
-                        <a:buClr>
-                          <a:srgbClr val="000000"/>
-                        </a:buClr>
-                        <a:buSzPct val="45000"/>
-                        <a:buFont typeface="Symbol"/>
-                        <a:buChar char=""/>
-                      </a:pPr>
-                      <a:r>
-                        <a:rPr b="0" lang="en-GB" sz="1200" spc="-1" strike="noStrike">
-                          <a:solidFill>
-                            <a:srgbClr val="ffffff"/>
-                          </a:solidFill>
-                          <a:latin typeface="Arial"/>
-                        </a:rPr>
-                        <a:t>1530</a:t>
-                      </a:r>
-                      <a:endParaRPr b="0" lang="en-GB" sz="1200" spc="-1" strike="noStrike">
-                        <a:latin typeface="Arial"/>
-                      </a:endParaRPr>
-                    </a:p>
-                  </a:txBody>
-                  <a:tcPr anchor="ctr" marL="90000" marR="90000">
-                    <a:lnL w="720">
-                      <a:solidFill>
-                        <a:srgbClr val="ffffff"/>
-                      </a:solidFill>
-                    </a:lnL>
-                    <a:lnR w="720">
-                      <a:solidFill>
-                        <a:srgbClr val="ffffff"/>
-                      </a:solidFill>
-                    </a:lnR>
-                    <a:lnT w="720">
-                      <a:solidFill>
-                        <a:srgbClr val="ffffff"/>
-                      </a:solidFill>
-                    </a:lnT>
-                    <a:lnB w="720">
-                      <a:solidFill>
-                        <a:srgbClr val="ffffff"/>
-                      </a:solidFill>
-                    </a:lnB>
-                    <a:solidFill>
-                      <a:srgbClr val="729fcf"/>
-                    </a:solidFill>
-                  </a:tcPr>
-                </a:tc>
-              </a:tr>
-              <a:tr h="496800">
-                <a:tc rowSpan="4">
-                  <a:txBody>
-                    <a:bodyPr lIns="90000" rIns="90000" anchor="ctr">
-                      <a:noAutofit/>
-                    </a:bodyPr>
-                    <a:p>
-                      <a:pPr algn="ctr">
-                        <a:lnSpc>
-                          <a:spcPct val="100000"/>
-                        </a:lnSpc>
-                        <a:buNone/>
-                      </a:pPr>
-                      <a:r>
-                        <a:rPr b="1" lang="en-GB" sz="1200" spc="-1" strike="noStrike">
-                          <a:solidFill>
-                            <a:srgbClr val="ffffff"/>
-                          </a:solidFill>
-                          <a:highlight>
-                            <a:srgbClr val="729fcf"/>
-                          </a:highlight>
-                          <a:latin typeface="Arial"/>
-                          <a:ea typeface="Microsoft YaHei"/>
-                        </a:rPr>
-                        <a:t>Screening &amp; Eligibility</a:t>
-                      </a:r>
-                      <a:endParaRPr b="0" lang="en-GB" sz="1200" spc="-1" strike="noStrike">
-                        <a:latin typeface="Arial"/>
-                      </a:endParaRPr>
-                    </a:p>
-                  </a:txBody>
-                  <a:tcPr anchor="ctr" marL="90000" marR="90000">
-                    <a:lnL w="720">
-                      <a:solidFill>
-                        <a:srgbClr val="ffffff"/>
-                      </a:solidFill>
-                    </a:lnL>
-                    <a:lnR w="720">
-                      <a:solidFill>
-                        <a:srgbClr val="ffffff"/>
-                      </a:solidFill>
-                    </a:lnR>
-                    <a:lnT w="720">
-                      <a:solidFill>
-                        <a:srgbClr val="ffffff"/>
-                      </a:solidFill>
-                    </a:lnT>
-                    <a:lnB w="720">
-                      <a:solidFill>
-                        <a:srgbClr val="ffffff"/>
-                      </a:solidFill>
-                    </a:lnB>
-                    <a:solidFill>
-                      <a:srgbClr val="729fcf"/>
-                    </a:solidFill>
-                  </a:tcPr>
-                </a:tc>
-                <a:tc rowSpan="4">
-                  <a:txBody>
-                    <a:bodyPr lIns="90000" rIns="90000" anchor="ctr">
-                      <a:noAutofit/>
-                    </a:bodyPr>
-                    <a:p>
-                      <a:pPr algn="ctr">
-                        <a:lnSpc>
-                          <a:spcPct val="100000"/>
-                        </a:lnSpc>
-                        <a:buNone/>
-                      </a:pPr>
-                      <a:r>
-                        <a:rPr b="0" lang="en-GB" sz="1200" spc="-1" strike="noStrike">
-                          <a:solidFill>
-                            <a:srgbClr val="ffffff"/>
-                          </a:solidFill>
-                          <a:latin typeface="Arial"/>
-                        </a:rPr>
-                        <a:t>Approach</a:t>
-                      </a:r>
-                      <a:endParaRPr b="0" lang="en-GB" sz="1200" spc="-1" strike="noStrike">
-                        <a:latin typeface="Arial"/>
-                      </a:endParaRPr>
-                    </a:p>
-                  </a:txBody>
-                  <a:tcPr anchor="ctr" marL="90000" marR="90000">
-                    <a:lnL w="720">
-                      <a:solidFill>
-                        <a:srgbClr val="ffffff"/>
-                      </a:solidFill>
-                    </a:lnL>
-                    <a:lnR w="720">
-                      <a:solidFill>
-                        <a:srgbClr val="ffffff"/>
-                      </a:solidFill>
-                    </a:lnR>
-                    <a:lnT w="720">
-                      <a:solidFill>
-                        <a:srgbClr val="ffffff"/>
-                      </a:solidFill>
-                    </a:lnT>
-                    <a:lnB w="720">
-                      <a:solidFill>
-                        <a:srgbClr val="ffffff"/>
-                      </a:solidFill>
-                    </a:lnB>
-                    <a:solidFill>
-                      <a:srgbClr val="729fcf"/>
-                    </a:solidFill>
-                  </a:tcPr>
-                </a:tc>
-                <a:tc>
-                  <a:txBody>
-                    <a:bodyPr lIns="90000" rIns="90000" anchor="ctr">
-                      <a:noAutofit/>
-                    </a:bodyPr>
-                    <a:p>
-                      <a:pPr>
-                        <a:lnSpc>
-                          <a:spcPct val="100000"/>
-                        </a:lnSpc>
-                        <a:buNone/>
-                      </a:pPr>
-                      <a:r>
-                        <a:rPr b="0" lang="en-GB" sz="1200" spc="-1" strike="noStrike">
-                          <a:solidFill>
-                            <a:srgbClr val="ffffff"/>
-                          </a:solidFill>
-                          <a:latin typeface="Arial"/>
-                          <a:ea typeface="Microsoft YaHei"/>
-                        </a:rPr>
-                        <a:t>Unrelated to selective logging</a:t>
-                      </a:r>
-                      <a:endParaRPr b="0" lang="en-GB" sz="1200" spc="-1" strike="noStrike">
-                        <a:latin typeface="Arial"/>
-                      </a:endParaRPr>
-                    </a:p>
-                  </a:txBody>
-                  <a:tcPr anchor="ctr" marL="90000" marR="90000">
-                    <a:lnL w="720">
-                      <a:solidFill>
-                        <a:srgbClr val="ffffff"/>
-                      </a:solidFill>
-                    </a:lnL>
-                    <a:lnR w="720">
-                      <a:solidFill>
-                        <a:srgbClr val="ffffff"/>
-                      </a:solidFill>
-                    </a:lnR>
-                    <a:lnT w="720">
-                      <a:solidFill>
-                        <a:srgbClr val="ffffff"/>
-                      </a:solidFill>
-                    </a:lnT>
-                    <a:lnB w="720">
-                      <a:solidFill>
-                        <a:srgbClr val="ffffff"/>
-                      </a:solidFill>
-                    </a:lnB>
-                    <a:solidFill>
-                      <a:srgbClr val="729fcf"/>
-                    </a:solidFill>
-                  </a:tcPr>
-                </a:tc>
-                <a:tc rowSpan="4">
-                  <a:txBody>
-                    <a:bodyPr lIns="90000" rIns="90000" anchor="ctr">
-                      <a:noAutofit/>
-                    </a:bodyPr>
-                    <a:p>
-                      <a:pPr algn="r">
-                        <a:lnSpc>
-                          <a:spcPct val="100000"/>
-                        </a:lnSpc>
-                        <a:buNone/>
-                      </a:pPr>
-                      <a:r>
-                        <a:rPr b="0" lang="en-GB" sz="1200" spc="-1" strike="noStrike">
-                          <a:solidFill>
-                            <a:srgbClr val="ffffff"/>
-                          </a:solidFill>
-                          <a:latin typeface="Arial"/>
-                        </a:rPr>
-                        <a:t>-108</a:t>
-                      </a:r>
-                      <a:endParaRPr b="0" lang="en-GB" sz="1200" spc="-1" strike="noStrike">
-                        <a:latin typeface="Arial"/>
-                      </a:endParaRPr>
-                    </a:p>
-                  </a:txBody>
-                  <a:tcPr anchor="ctr" marL="90000" marR="90000">
-                    <a:lnL w="720">
-                      <a:solidFill>
-                        <a:srgbClr val="ffffff"/>
-                      </a:solidFill>
-                    </a:lnL>
-                    <a:lnR w="720">
-                      <a:solidFill>
-                        <a:srgbClr val="ffffff"/>
-                      </a:solidFill>
-                    </a:lnR>
-                    <a:lnT w="720">
-                      <a:solidFill>
-                        <a:srgbClr val="ffffff"/>
-                      </a:solidFill>
-                    </a:lnT>
-                    <a:lnB w="720">
-                      <a:solidFill>
-                        <a:srgbClr val="ffffff"/>
-                      </a:solidFill>
-                    </a:lnB>
-                    <a:solidFill>
-                      <a:srgbClr val="729fcf"/>
-                    </a:solidFill>
-                  </a:tcPr>
-                </a:tc>
-              </a:tr>
-              <a:tr h="496800">
-                <a:tc vMerge="1">
-                  <a:tcPr anchor="t" marL="90000" marR="90000">
-                    <a:solidFill>
-                      <a:srgbClr val="729fcf"/>
-                    </a:solidFill>
-                  </a:tcPr>
-                </a:tc>
-                <a:tc vMerge="1">
-                  <a:tcPr anchor="t" marL="90000" marR="90000">
-                    <a:solidFill>
-                      <a:srgbClr val="729fcf"/>
-                    </a:solidFill>
-                  </a:tcPr>
-                </a:tc>
-                <a:tc>
-                  <a:txBody>
-                    <a:bodyPr lIns="90000" rIns="90000" anchor="ctr">
-                      <a:noAutofit/>
-                    </a:bodyPr>
-                    <a:p>
-                      <a:pPr>
-                        <a:lnSpc>
-                          <a:spcPct val="100000"/>
-                        </a:lnSpc>
-                        <a:buNone/>
-                      </a:pPr>
-                      <a:r>
-                        <a:rPr b="0" lang="en-GB" sz="1200" spc="-1" strike="noStrike">
-                          <a:solidFill>
-                            <a:srgbClr val="ffffff"/>
-                          </a:solidFill>
-                          <a:latin typeface="Arial"/>
-                        </a:rPr>
-                        <a:t>Publications that involve a general debate</a:t>
-                      </a:r>
-                      <a:endParaRPr b="0" lang="en-GB" sz="1200" spc="-1" strike="noStrike">
-                        <a:latin typeface="Arial"/>
-                      </a:endParaRPr>
-                    </a:p>
-                  </a:txBody>
-                  <a:tcPr anchor="ctr" marL="90000" marR="90000">
-                    <a:lnL w="720">
-                      <a:solidFill>
-                        <a:srgbClr val="ffffff"/>
-                      </a:solidFill>
-                    </a:lnL>
-                    <a:lnR w="720">
-                      <a:solidFill>
-                        <a:srgbClr val="ffffff"/>
-                      </a:solidFill>
-                    </a:lnR>
-                    <a:lnT w="720">
-                      <a:solidFill>
-                        <a:srgbClr val="ffffff"/>
-                      </a:solidFill>
-                    </a:lnT>
-                    <a:lnB w="720">
-                      <a:solidFill>
-                        <a:srgbClr val="ffffff"/>
-                      </a:solidFill>
-                    </a:lnB>
-                    <a:solidFill>
-                      <a:srgbClr val="729fcf"/>
-                    </a:solidFill>
-                  </a:tcPr>
-                </a:tc>
-                <a:tc vMerge="1">
-                  <a:tcPr anchor="t" marL="90000" marR="90000">
-                    <a:solidFill>
-                      <a:srgbClr val="729fcf"/>
-                    </a:solidFill>
-                  </a:tcPr>
-                </a:tc>
-              </a:tr>
-              <a:tr h="490320">
-                <a:tc vMerge="1">
-                  <a:tcPr anchor="t" marL="90000" marR="90000">
-                    <a:solidFill>
-                      <a:srgbClr val="729fcf"/>
-                    </a:solidFill>
-                  </a:tcPr>
-                </a:tc>
-                <a:tc vMerge="1">
-                  <a:tcPr anchor="t" marL="90000" marR="90000">
-                    <a:solidFill>
-                      <a:srgbClr val="729fcf"/>
-                    </a:solidFill>
-                  </a:tcPr>
-                </a:tc>
-                <a:tc>
-                  <a:txBody>
-                    <a:bodyPr lIns="90000" rIns="90000" anchor="ctr">
-                      <a:noAutofit/>
-                    </a:bodyPr>
-                    <a:p>
-                      <a:pPr>
-                        <a:lnSpc>
-                          <a:spcPct val="100000"/>
-                        </a:lnSpc>
-                        <a:buNone/>
-                      </a:pPr>
-                      <a:r>
-                        <a:rPr b="0" lang="en-GB" sz="1200" spc="-1" strike="noStrike">
-                          <a:solidFill>
-                            <a:srgbClr val="ffffff"/>
-                          </a:solidFill>
-                          <a:latin typeface="Arial"/>
-                        </a:rPr>
-                        <a:t>Publications that do not present original research </a:t>
-                      </a:r>
-                      <a:br/>
-                      <a:r>
-                        <a:rPr b="0" lang="en-GB" sz="900" spc="-1" strike="noStrike">
-                          <a:solidFill>
-                            <a:srgbClr val="ffffff"/>
-                          </a:solidFill>
-                          <a:latin typeface="Arial"/>
-                        </a:rPr>
-                        <a:t>(e.g. comments, letters, editorials)</a:t>
-                      </a:r>
-                      <a:endParaRPr b="0" lang="en-GB" sz="900" spc="-1" strike="noStrike">
-                        <a:latin typeface="Arial"/>
-                      </a:endParaRPr>
-                    </a:p>
-                  </a:txBody>
-                  <a:tcPr anchor="ctr" marL="90000" marR="90000">
-                    <a:lnL w="720">
-                      <a:solidFill>
-                        <a:srgbClr val="ffffff"/>
-                      </a:solidFill>
-                    </a:lnL>
-                    <a:lnR w="720">
-                      <a:solidFill>
-                        <a:srgbClr val="ffffff"/>
-                      </a:solidFill>
-                    </a:lnR>
-                    <a:lnT w="720">
-                      <a:solidFill>
-                        <a:srgbClr val="ffffff"/>
-                      </a:solidFill>
-                    </a:lnT>
-                    <a:lnB w="720">
-                      <a:solidFill>
-                        <a:srgbClr val="ffffff"/>
-                      </a:solidFill>
-                    </a:lnB>
-                    <a:solidFill>
-                      <a:srgbClr val="729fcf"/>
-                    </a:solidFill>
-                  </a:tcPr>
-                </a:tc>
-                <a:tc vMerge="1">
-                  <a:tcPr anchor="t" marL="90000" marR="90000">
-                    <a:solidFill>
-                      <a:srgbClr val="729fcf"/>
-                    </a:solidFill>
-                  </a:tcPr>
-                </a:tc>
-              </a:tr>
-              <a:tr h="490320">
-                <a:tc vMerge="1">
-                  <a:tcPr anchor="t" marL="90000" marR="90000">
-                    <a:solidFill>
-                      <a:srgbClr val="729fcf"/>
-                    </a:solidFill>
-                  </a:tcPr>
-                </a:tc>
-                <a:tc vMerge="1">
-                  <a:tcPr anchor="t" marL="90000" marR="90000">
-                    <a:solidFill>
-                      <a:srgbClr val="729fcf"/>
-                    </a:solidFill>
-                  </a:tcPr>
-                </a:tc>
-                <a:tc>
-                  <a:txBody>
-                    <a:bodyPr lIns="90000" rIns="90000" anchor="ctr">
-                      <a:noAutofit/>
-                    </a:bodyPr>
-                    <a:p>
-                      <a:pPr>
-                        <a:lnSpc>
-                          <a:spcPct val="100000"/>
-                        </a:lnSpc>
-                        <a:buNone/>
-                      </a:pPr>
-                      <a:r>
-                        <a:rPr b="0" lang="en-GB" sz="1200" spc="-1" strike="noStrike">
-                          <a:solidFill>
-                            <a:srgbClr val="ffffff"/>
-                          </a:solidFill>
-                          <a:latin typeface="Arial"/>
-                        </a:rPr>
-                        <a:t>Gray literature</a:t>
-                      </a:r>
-                      <a:endParaRPr b="0" lang="en-GB" sz="1200" spc="-1" strike="noStrike">
-                        <a:latin typeface="Arial"/>
-                      </a:endParaRPr>
-                    </a:p>
-                  </a:txBody>
-                  <a:tcPr anchor="ctr" marL="90000" marR="90000">
-                    <a:lnL w="720">
-                      <a:solidFill>
-                        <a:srgbClr val="ffffff"/>
-                      </a:solidFill>
-                    </a:lnL>
-                    <a:lnR w="720">
-                      <a:solidFill>
-                        <a:srgbClr val="ffffff"/>
-                      </a:solidFill>
-                    </a:lnR>
-                    <a:lnT w="720">
-                      <a:solidFill>
-                        <a:srgbClr val="ffffff"/>
-                      </a:solidFill>
-                    </a:lnT>
-                    <a:lnB w="720">
-                      <a:solidFill>
-                        <a:srgbClr val="ffffff"/>
-                      </a:solidFill>
-                    </a:lnB>
-                    <a:solidFill>
-                      <a:srgbClr val="729fcf"/>
-                    </a:solidFill>
-                  </a:tcPr>
-                </a:tc>
-                <a:tc vMerge="1">
-                  <a:tcPr anchor="t" marL="90000" marR="90000">
-                    <a:solidFill>
-                      <a:srgbClr val="729fcf"/>
-                    </a:solidFill>
-                  </a:tcPr>
-                </a:tc>
-              </a:tr>
-              <a:tr h="490320">
-                <a:tc>
-                  <a:txBody>
-                    <a:bodyPr lIns="90000" rIns="90000" anchor="ctr">
-                      <a:noAutofit/>
-                    </a:bodyPr>
-                    <a:p>
-                      <a:pPr algn="ctr">
-                        <a:lnSpc>
-                          <a:spcPct val="100000"/>
-                        </a:lnSpc>
-                        <a:buNone/>
-                      </a:pPr>
-                      <a:r>
-                        <a:rPr b="1" lang="en-GB" sz="1200" spc="-1" strike="noStrike">
-                          <a:solidFill>
-                            <a:srgbClr val="ffffff"/>
-                          </a:solidFill>
-                          <a:highlight>
-                            <a:srgbClr val="729fcf"/>
-                          </a:highlight>
-                          <a:latin typeface="Arial"/>
-                        </a:rPr>
-                        <a:t>Included</a:t>
-                      </a:r>
-                      <a:endParaRPr b="0" lang="en-GB" sz="1200" spc="-1" strike="noStrike">
-                        <a:latin typeface="Arial"/>
-                      </a:endParaRPr>
-                    </a:p>
-                  </a:txBody>
-                  <a:tcPr anchor="ctr" marL="90000" marR="90000">
-                    <a:lnL w="720">
-                      <a:solidFill>
-                        <a:srgbClr val="ffffff"/>
-                      </a:solidFill>
-                    </a:lnL>
-                    <a:lnR w="720">
-                      <a:solidFill>
-                        <a:srgbClr val="ffffff"/>
-                      </a:solidFill>
-                    </a:lnR>
-                    <a:lnT w="720">
-                      <a:solidFill>
-                        <a:srgbClr val="ffffff"/>
-                      </a:solidFill>
-                    </a:lnT>
-                    <a:lnB w="720">
-                      <a:solidFill>
-                        <a:srgbClr val="ffffff"/>
-                      </a:solidFill>
-                    </a:lnB>
-                    <a:solidFill>
-                      <a:srgbClr val="729fcf"/>
-                    </a:solidFill>
-                  </a:tcPr>
-                </a:tc>
-                <a:tc>
-                  <a:tcPr anchor="ctr" marL="90000" marR="90000">
-                    <a:lnL w="720">
-                      <a:solidFill>
-                        <a:srgbClr val="ffffff"/>
-                      </a:solidFill>
-                    </a:lnL>
-                    <a:lnR w="720">
-                      <a:solidFill>
-                        <a:srgbClr val="ffffff"/>
-                      </a:solidFill>
-                    </a:lnR>
-                    <a:lnT w="720">
-                      <a:solidFill>
-                        <a:srgbClr val="ffffff"/>
-                      </a:solidFill>
-                    </a:lnT>
-                    <a:lnB w="720">
-                      <a:solidFill>
-                        <a:srgbClr val="ffffff"/>
-                      </a:solidFill>
-                    </a:lnB>
-                    <a:solidFill>
-                      <a:srgbClr val="729fcf"/>
-                    </a:solidFill>
-                  </a:tcPr>
-                </a:tc>
-                <a:tc>
-                  <a:txBody>
-                    <a:bodyPr lIns="90000" rIns="90000" anchor="ctr">
-                      <a:noAutofit/>
-                    </a:bodyPr>
-                    <a:p>
-                      <a:pPr>
-                        <a:lnSpc>
-                          <a:spcPct val="100000"/>
-                        </a:lnSpc>
-                        <a:buNone/>
-                      </a:pPr>
-                      <a:r>
-                        <a:rPr b="0" lang="en-GB" sz="1200" spc="-1" strike="noStrike">
-                          <a:solidFill>
-                            <a:srgbClr val="ffffff"/>
-                          </a:solidFill>
-                          <a:latin typeface="Arial"/>
-                        </a:rPr>
-                        <a:t>Full scoping</a:t>
-                      </a:r>
-                      <a:endParaRPr b="0" lang="en-GB" sz="1200" spc="-1" strike="noStrike">
-                        <a:latin typeface="Arial"/>
-                      </a:endParaRPr>
-                    </a:p>
-                  </a:txBody>
-                  <a:tcPr anchor="ctr" marL="90000" marR="90000">
-                    <a:lnL w="720">
-                      <a:solidFill>
-                        <a:srgbClr val="ffffff"/>
-                      </a:solidFill>
-                    </a:lnL>
-                    <a:lnR w="720">
-                      <a:solidFill>
-                        <a:srgbClr val="ffffff"/>
-                      </a:solidFill>
-                    </a:lnR>
-                    <a:lnT w="720">
-                      <a:solidFill>
-                        <a:srgbClr val="ffffff"/>
-                      </a:solidFill>
-                    </a:lnT>
-                    <a:lnB w="720">
-                      <a:solidFill>
-                        <a:srgbClr val="ffffff"/>
-                      </a:solidFill>
-                    </a:lnB>
-                    <a:solidFill>
-                      <a:srgbClr val="729fcf"/>
-                    </a:solidFill>
-                  </a:tcPr>
-                </a:tc>
-                <a:tc>
-                  <a:txBody>
-                    <a:bodyPr lIns="90000" rIns="90000" anchor="ctr">
-                      <a:noAutofit/>
-                    </a:bodyPr>
-                    <a:p>
-                      <a:pPr algn="r">
-                        <a:lnSpc>
-                          <a:spcPct val="100000"/>
-                        </a:lnSpc>
-                        <a:buNone/>
-                      </a:pPr>
-                      <a:r>
-                        <a:rPr b="0" lang="en-GB" sz="1200" spc="-1" strike="noStrike">
-                          <a:solidFill>
-                            <a:srgbClr val="ffffff"/>
-                          </a:solidFill>
-                          <a:latin typeface="Arial"/>
-                        </a:rPr>
-                        <a:t>44 (+23?)</a:t>
-                      </a:r>
-                      <a:endParaRPr b="0" lang="en-GB" sz="1200" spc="-1" strike="noStrike">
-                        <a:latin typeface="Arial"/>
-                      </a:endParaRPr>
-                    </a:p>
-                  </a:txBody>
-                  <a:tcPr anchor="ctr" marL="90000" marR="90000">
-                    <a:lnL w="720">
-                      <a:solidFill>
-                        <a:srgbClr val="ffffff"/>
-                      </a:solidFill>
-                    </a:lnL>
-                    <a:lnR w="720">
-                      <a:solidFill>
-                        <a:srgbClr val="ffffff"/>
-                      </a:solidFill>
-                    </a:lnR>
-                    <a:lnT w="720">
-                      <a:solidFill>
-                        <a:srgbClr val="ffffff"/>
-                      </a:solidFill>
-                    </a:lnT>
-                    <a:lnB w="720">
-                      <a:solidFill>
-                        <a:srgbClr val="ffffff"/>
-                      </a:solidFill>
-                    </a:lnB>
-                    <a:solidFill>
-                      <a:srgbClr val="729fcf"/>
-                    </a:solidFill>
-                  </a:tcPr>
-                </a:tc>
-              </a:tr>
-            </a:tbl>
-          </a:graphicData>
-        </a:graphic>
-      </p:graphicFrame>
-      <p:sp>
-        <p:nvSpPr>
-          <p:cNvPr id="51" name=""/>
-          <p:cNvSpPr txBox="1"/>
+        </p:nvPicPr>
+        <p:blipFill>
+          <a:blip r:embed="rId2"/>
+          <a:stretch/>
+        </p:blipFill>
+        <p:spPr>
+          <a:xfrm>
+            <a:off x="488880" y="3181680"/>
+            <a:ext cx="4191120" cy="2038320"/>
+          </a:xfrm>
+          <a:prstGeom prst="rect">
+            <a:avLst/>
+          </a:prstGeom>
+          <a:ln w="0">
+            <a:noFill/>
+          </a:ln>
+        </p:spPr>
+      </p:pic>
+      <p:pic>
+        <p:nvPicPr>
+          <p:cNvPr id="53" name="" descr=""/>
+          <p:cNvPicPr/>
           <p:nvPr/>
-        </p:nvSpPr>
-        <p:spPr>
-          <a:xfrm>
-            <a:off x="7740000" y="819720"/>
-            <a:ext cx="1260000" cy="431640"/>
-          </a:xfrm>
-          <a:prstGeom prst="rect">
-            <a:avLst/>
-          </a:prstGeom>
-          <a:noFill/>
-          <a:ln w="0">
-            <a:noFill/>
-          </a:ln>
-        </p:spPr>
-        <p:txBody>
-          <a:bodyPr lIns="90000" rIns="90000" tIns="45000" bIns="45000" anchor="t">
-            <a:noAutofit/>
-          </a:bodyPr>
-          <a:p>
-            <a:r>
-              <a:rPr b="0" lang="en-GB" sz="1200" spc="-1" strike="noStrike">
-                <a:latin typeface="Arial"/>
-              </a:rPr>
-              <a:t>09/06/2022</a:t>
-            </a:r>
-            <a:endParaRPr b="0" lang="en-GB" sz="1200" spc="-1" strike="noStrike">
-              <a:latin typeface="Arial"/>
-            </a:endParaRPr>
-          </a:p>
-          <a:p>
-            <a:r>
-              <a:rPr b="0" lang="en-GB" sz="1200" spc="-1" strike="noStrike">
-                <a:latin typeface="Arial"/>
-              </a:rPr>
-              <a:t>N=175</a:t>
-            </a:r>
-            <a:endParaRPr b="0" lang="en-GB" sz="1200" spc="-1" strike="noStrike">
-              <a:latin typeface="Arial"/>
-            </a:endParaRPr>
-          </a:p>
-        </p:txBody>
-      </p:sp>
+        </p:nvPicPr>
+        <p:blipFill>
+          <a:blip r:embed="rId3"/>
+          <a:stretch/>
+        </p:blipFill>
+        <p:spPr>
+          <a:xfrm>
+            <a:off x="5150520" y="3241080"/>
+            <a:ext cx="4569480" cy="1920600"/>
+          </a:xfrm>
+          <a:prstGeom prst="rect">
+            <a:avLst/>
+          </a:prstGeom>
+          <a:ln w="0">
+            <a:noFill/>
+          </a:ln>
+        </p:spPr>
+      </p:pic>
     </p:spTree>
   </p:cSld>
   <mc:AlternateContent>

</xml_diff>